<commit_message>
Updated Powerpoint Fixed a code snippet and added another one
</commit_message>
<xml_diff>
--- a/WCF RIA Services/WCF RIA Services.pptx
+++ b/WCF RIA Services/WCF RIA Services.pptx
@@ -194,7 +194,8 @@
           <a:p>
             <a:fld id="{DA25CEF9-644C-4ADA-8E8F-EAF6E68D1676}" type="datetimeFigureOut">
               <a:rPr lang="en-US" smtClean="0"/>
-              <a:t>8/19/2010</a:t>
+              <a:pPr/>
+              <a:t>08/23/2010</a:t>
             </a:fld>
             <a:endParaRPr lang="en-US"/>
           </a:p>
@@ -355,6 +356,7 @@
           <a:p>
             <a:fld id="{63F09BA1-1EA8-4118-B687-2146A5130C96}" type="slidenum">
               <a:rPr lang="en-US" smtClean="0"/>
+              <a:pPr/>
               <a:t>‹#›</a:t>
             </a:fld>
             <a:endParaRPr lang="en-US"/>
@@ -526,6 +528,7 @@
           <a:p>
             <a:fld id="{63F09BA1-1EA8-4118-B687-2146A5130C96}" type="slidenum">
               <a:rPr lang="en-US" smtClean="0"/>
+              <a:pPr/>
               <a:t>1</a:t>
             </a:fld>
             <a:endParaRPr lang="en-US"/>
@@ -607,6 +610,7 @@
           <a:p>
             <a:fld id="{63F09BA1-1EA8-4118-B687-2146A5130C96}" type="slidenum">
               <a:rPr lang="en-US" smtClean="0"/>
+              <a:pPr/>
               <a:t>2</a:t>
             </a:fld>
             <a:endParaRPr lang="en-US"/>
@@ -688,6 +692,7 @@
           <a:p>
             <a:fld id="{63F09BA1-1EA8-4118-B687-2146A5130C96}" type="slidenum">
               <a:rPr lang="en-US" smtClean="0"/>
+              <a:pPr/>
               <a:t>3</a:t>
             </a:fld>
             <a:endParaRPr lang="en-US"/>
@@ -1096,7 +1101,8 @@
           <a:p>
             <a:fld id="{0573B876-F561-4423-95C1-908C18DBC55C}" type="datetimeFigureOut">
               <a:rPr lang="en-US" smtClean="0"/>
-              <a:t>8/19/2010</a:t>
+              <a:pPr/>
+              <a:t>08/23/2010</a:t>
             </a:fld>
             <a:endParaRPr lang="en-US"/>
           </a:p>
@@ -1138,6 +1144,7 @@
           <a:p>
             <a:fld id="{9E7E6F0C-F3AE-4887-8A34-CEAD07A53B72}" type="slidenum">
               <a:rPr lang="en-US" smtClean="0"/>
+              <a:pPr/>
               <a:t>‹#›</a:t>
             </a:fld>
             <a:endParaRPr lang="en-US"/>
@@ -1243,7 +1250,8 @@
           <a:p>
             <a:fld id="{0573B876-F561-4423-95C1-908C18DBC55C}" type="datetimeFigureOut">
               <a:rPr lang="en-US" smtClean="0"/>
-              <a:t>8/19/2010</a:t>
+              <a:pPr/>
+              <a:t>08/23/2010</a:t>
             </a:fld>
             <a:endParaRPr lang="en-US"/>
           </a:p>
@@ -1285,6 +1293,7 @@
           <a:p>
             <a:fld id="{9E7E6F0C-F3AE-4887-8A34-CEAD07A53B72}" type="slidenum">
               <a:rPr lang="en-US" smtClean="0"/>
+              <a:pPr/>
               <a:t>‹#›</a:t>
             </a:fld>
             <a:endParaRPr lang="en-US"/>
@@ -1650,7 +1659,8 @@
           <a:p>
             <a:fld id="{0573B876-F561-4423-95C1-908C18DBC55C}" type="datetimeFigureOut">
               <a:rPr lang="en-US" smtClean="0"/>
-              <a:t>8/19/2010</a:t>
+              <a:pPr/>
+              <a:t>08/23/2010</a:t>
             </a:fld>
             <a:endParaRPr lang="en-US"/>
           </a:p>
@@ -1692,6 +1702,7 @@
           <a:p>
             <a:fld id="{9E7E6F0C-F3AE-4887-8A34-CEAD07A53B72}" type="slidenum">
               <a:rPr lang="en-US" smtClean="0"/>
+              <a:pPr/>
               <a:t>‹#›</a:t>
             </a:fld>
             <a:endParaRPr lang="en-US"/>
@@ -1998,7 +2009,8 @@
           <a:p>
             <a:fld id="{0573B876-F561-4423-95C1-908C18DBC55C}" type="datetimeFigureOut">
               <a:rPr lang="en-US" smtClean="0"/>
-              <a:t>8/19/2010</a:t>
+              <a:pPr/>
+              <a:t>08/23/2010</a:t>
             </a:fld>
             <a:endParaRPr lang="en-US"/>
           </a:p>
@@ -2040,6 +2052,7 @@
           <a:p>
             <a:fld id="{9E7E6F0C-F3AE-4887-8A34-CEAD07A53B72}" type="slidenum">
               <a:rPr lang="en-US" smtClean="0"/>
+              <a:pPr/>
               <a:t>‹#›</a:t>
             </a:fld>
             <a:endParaRPr lang="en-US"/>
@@ -2464,7 +2477,8 @@
           <a:p>
             <a:fld id="{0573B876-F561-4423-95C1-908C18DBC55C}" type="datetimeFigureOut">
               <a:rPr lang="en-US" smtClean="0"/>
-              <a:t>8/19/2010</a:t>
+              <a:pPr/>
+              <a:t>08/23/2010</a:t>
             </a:fld>
             <a:endParaRPr lang="en-US"/>
           </a:p>
@@ -2506,6 +2520,7 @@
           <a:p>
             <a:fld id="{9E7E6F0C-F3AE-4887-8A34-CEAD07A53B72}" type="slidenum">
               <a:rPr lang="en-US" smtClean="0"/>
+              <a:pPr/>
               <a:t>‹#›</a:t>
             </a:fld>
             <a:endParaRPr lang="en-US"/>
@@ -2925,7 +2940,8 @@
           <a:p>
             <a:fld id="{0573B876-F561-4423-95C1-908C18DBC55C}" type="datetimeFigureOut">
               <a:rPr lang="en-US" smtClean="0"/>
-              <a:t>8/19/2010</a:t>
+              <a:pPr/>
+              <a:t>08/23/2010</a:t>
             </a:fld>
             <a:endParaRPr lang="en-US"/>
           </a:p>
@@ -2967,6 +2983,7 @@
           <a:p>
             <a:fld id="{9E7E6F0C-F3AE-4887-8A34-CEAD07A53B72}" type="slidenum">
               <a:rPr lang="en-US" smtClean="0"/>
+              <a:pPr/>
               <a:t>‹#›</a:t>
             </a:fld>
             <a:endParaRPr lang="en-US"/>
@@ -3539,7 +3556,8 @@
           <a:p>
             <a:fld id="{0573B876-F561-4423-95C1-908C18DBC55C}" type="datetimeFigureOut">
               <a:rPr lang="en-US" smtClean="0"/>
-              <a:t>8/19/2010</a:t>
+              <a:pPr/>
+              <a:t>08/23/2010</a:t>
             </a:fld>
             <a:endParaRPr lang="en-US"/>
           </a:p>
@@ -3581,6 +3599,7 @@
           <a:p>
             <a:fld id="{9E7E6F0C-F3AE-4887-8A34-CEAD07A53B72}" type="slidenum">
               <a:rPr lang="en-US" smtClean="0"/>
+              <a:pPr/>
               <a:t>‹#›</a:t>
             </a:fld>
             <a:endParaRPr lang="en-US"/>
@@ -3853,7 +3872,8 @@
           <a:p>
             <a:fld id="{0573B876-F561-4423-95C1-908C18DBC55C}" type="datetimeFigureOut">
               <a:rPr lang="en-US" smtClean="0"/>
-              <a:t>8/19/2010</a:t>
+              <a:pPr/>
+              <a:t>08/23/2010</a:t>
             </a:fld>
             <a:endParaRPr lang="en-US"/>
           </a:p>
@@ -3895,6 +3915,7 @@
           <a:p>
             <a:fld id="{9E7E6F0C-F3AE-4887-8A34-CEAD07A53B72}" type="slidenum">
               <a:rPr lang="en-US" smtClean="0"/>
+              <a:pPr/>
               <a:t>‹#›</a:t>
             </a:fld>
             <a:endParaRPr lang="en-US"/>
@@ -4172,7 +4193,8 @@
           <a:p>
             <a:fld id="{0573B876-F561-4423-95C1-908C18DBC55C}" type="datetimeFigureOut">
               <a:rPr lang="en-US" smtClean="0"/>
-              <a:t>8/19/2010</a:t>
+              <a:pPr/>
+              <a:t>08/23/2010</a:t>
             </a:fld>
             <a:endParaRPr lang="en-US"/>
           </a:p>
@@ -4214,6 +4236,7 @@
           <a:p>
             <a:fld id="{9E7E6F0C-F3AE-4887-8A34-CEAD07A53B72}" type="slidenum">
               <a:rPr lang="en-US" smtClean="0"/>
+              <a:pPr/>
               <a:t>‹#›</a:t>
             </a:fld>
             <a:endParaRPr lang="en-US"/>
@@ -4650,7 +4673,8 @@
           <a:p>
             <a:fld id="{0573B876-F561-4423-95C1-908C18DBC55C}" type="datetimeFigureOut">
               <a:rPr lang="en-US" smtClean="0"/>
-              <a:t>8/19/2010</a:t>
+              <a:pPr/>
+              <a:t>08/23/2010</a:t>
             </a:fld>
             <a:endParaRPr lang="en-US"/>
           </a:p>
@@ -4692,6 +4716,7 @@
           <a:p>
             <a:fld id="{9E7E6F0C-F3AE-4887-8A34-CEAD07A53B72}" type="slidenum">
               <a:rPr lang="en-US" smtClean="0"/>
+              <a:pPr/>
               <a:t>‹#›</a:t>
             </a:fld>
             <a:endParaRPr lang="en-US"/>
@@ -5085,7 +5110,8 @@
           <a:p>
             <a:fld id="{0573B876-F561-4423-95C1-908C18DBC55C}" type="datetimeFigureOut">
               <a:rPr lang="en-US" smtClean="0"/>
-              <a:t>8/19/2010</a:t>
+              <a:pPr/>
+              <a:t>08/23/2010</a:t>
             </a:fld>
             <a:endParaRPr lang="en-US"/>
           </a:p>
@@ -5127,6 +5153,7 @@
           <a:p>
             <a:fld id="{9E7E6F0C-F3AE-4887-8A34-CEAD07A53B72}" type="slidenum">
               <a:rPr lang="en-US" smtClean="0"/>
+              <a:pPr/>
               <a:t>‹#›</a:t>
             </a:fld>
             <a:endParaRPr lang="en-US"/>
@@ -5517,7 +5544,8 @@
           <a:p>
             <a:fld id="{0573B876-F561-4423-95C1-908C18DBC55C}" type="datetimeFigureOut">
               <a:rPr lang="en-US" smtClean="0"/>
-              <a:t>8/19/2010</a:t>
+              <a:pPr/>
+              <a:t>08/23/2010</a:t>
             </a:fld>
             <a:endParaRPr lang="en-US"/>
           </a:p>
@@ -5591,6 +5619,7 @@
           <a:p>
             <a:fld id="{9E7E6F0C-F3AE-4887-8A34-CEAD07A53B72}" type="slidenum">
               <a:rPr lang="en-US" smtClean="0"/>
+              <a:pPr/>
               <a:t>‹#›</a:t>
             </a:fld>
             <a:endParaRPr lang="en-US"/>
@@ -6080,6 +6109,13 @@
   <p:clrMapOvr>
     <a:masterClrMapping/>
   </p:clrMapOvr>
+  <p:timing>
+    <p:tnLst>
+      <p:par>
+        <p:cTn id="1" dur="indefinite" restart="never" nodeType="tmRoot"/>
+      </p:par>
+    </p:tnLst>
+  </p:timing>
 </p:sld>
 </file>
 
@@ -6200,6 +6236,13 @@
   <p:clrMapOvr>
     <a:masterClrMapping/>
   </p:clrMapOvr>
+  <p:timing>
+    <p:tnLst>
+      <p:par>
+        <p:cTn id="1" dur="indefinite" restart="never" nodeType="tmRoot"/>
+      </p:par>
+    </p:tnLst>
+  </p:timing>
 </p:sld>
 </file>
 
@@ -6249,96 +6292,59 @@
           </a:p>
         </p:txBody>
       </p:sp>
-      <p:sp>
-        <p:nvSpPr>
-          <p:cNvPr id="6" name="Content Placeholder 5"/>
-          <p:cNvSpPr>
-            <a:spLocks noGrp="1"/>
-          </p:cNvSpPr>
-          <p:nvPr>
-            <p:ph idx="1"/>
-          </p:nvPr>
+      <p:pic>
+        <p:nvPicPr>
+          <p:cNvPr id="2050" name="Picture 2" descr="C:\Users\yoderp\AppData\Local\Temp\SNAGHTML12e36c2d.PNG"/>
+          <p:cNvPicPr>
+            <a:picLocks noChangeAspect="1" noChangeArrowheads="1"/>
+          </p:cNvPicPr>
+          <p:nvPr/>
+        </p:nvPicPr>
+        <p:blipFill>
+          <a:blip r:embed="rId3" cstate="print"/>
+          <a:srcRect/>
+          <a:stretch>
+            <a:fillRect/>
+          </a:stretch>
+        </p:blipFill>
+        <p:spPr bwMode="auto">
+          <a:xfrm>
+            <a:off x="3505200" y="1771650"/>
+            <a:ext cx="5495925" cy="5086350"/>
+          </a:xfrm>
+          <a:prstGeom prst="rect">
+            <a:avLst/>
+          </a:prstGeom>
+          <a:noFill/>
+        </p:spPr>
+      </p:pic>
+      <p:sp>
+        <p:nvSpPr>
+          <p:cNvPr id="7" name="TextBox 6"/>
+          <p:cNvSpPr txBox="1"/>
+          <p:nvPr/>
         </p:nvSpPr>
         <p:spPr>
           <a:xfrm>
-            <a:off x="457200" y="1828800"/>
-            <a:ext cx="8229600" cy="4572000"/>
+            <a:off x="228600" y="1752600"/>
+            <a:ext cx="3048000" cy="2062103"/>
           </a:xfrm>
+          <a:prstGeom prst="rect">
+            <a:avLst/>
+          </a:prstGeom>
+          <a:noFill/>
         </p:spPr>
         <p:txBody>
-          <a:bodyPr>
-            <a:normAutofit/>
+          <a:bodyPr wrap="square" rtlCol="0">
+            <a:spAutoFit/>
           </a:bodyPr>
           <a:lstStyle/>
           <a:p>
-            <a:pPr>
-              <a:buNone/>
-            </a:pPr>
-            <a:r>
-              <a:rPr lang="en-US" dirty="0" smtClean="0"/>
-              <a:t>To get started or to learn more on RIA Services</a:t>
-            </a:r>
-          </a:p>
-          <a:p>
-            <a:pPr>
-              <a:buNone/>
-            </a:pPr>
-            <a:r>
-              <a:rPr lang="en-US" dirty="0" smtClean="0"/>
-              <a:t>Visit:</a:t>
-            </a:r>
-          </a:p>
-          <a:p>
-            <a:pPr>
-              <a:buNone/>
-            </a:pPr>
-            <a:endParaRPr lang="en-US" sz="2400" dirty="0" smtClean="0"/>
-          </a:p>
-          <a:p>
-            <a:pPr>
-              <a:buNone/>
-            </a:pPr>
-            <a:r>
-              <a:rPr lang="en-US" sz="2400" dirty="0" smtClean="0">
-                <a:hlinkClick r:id="rId3"/>
-              </a:rPr>
-              <a:t>http://msdn.microsoft.com/en-us/library/ee707344(VS.91).</a:t>
-            </a:r>
-            <a:r>
-              <a:rPr lang="en-US" sz="2400" dirty="0" smtClean="0">
-                <a:hlinkClick r:id="rId3"/>
-              </a:rPr>
-              <a:t>aspx</a:t>
-            </a:r>
-            <a:endParaRPr lang="en-US" sz="2400" dirty="0" smtClean="0"/>
-          </a:p>
-          <a:p>
-            <a:pPr>
-              <a:buNone/>
-            </a:pPr>
-            <a:endParaRPr lang="en-US" dirty="0" smtClean="0"/>
-          </a:p>
-          <a:p>
-            <a:pPr>
-              <a:buNone/>
-            </a:pPr>
-            <a:r>
-              <a:rPr lang="en-US" smtClean="0"/>
-              <a:t>xxxxxx</a:t>
-            </a:r>
-            <a:endParaRPr lang="en-US" dirty="0" smtClean="0"/>
-          </a:p>
-          <a:p>
-            <a:pPr>
-              <a:buNone/>
-            </a:pPr>
-            <a:endParaRPr lang="en-US" dirty="0" smtClean="0"/>
-          </a:p>
-          <a:p>
-            <a:pPr>
-              <a:buNone/>
-            </a:pPr>
-            <a:endParaRPr lang="en-US" dirty="0"/>
+            <a:r>
+              <a:rPr lang="en-US" sz="3200" dirty="0" smtClean="0"/>
+              <a:t>Find Resources on the Time Monkey Project Wiki</a:t>
+            </a:r>
+            <a:endParaRPr lang="en-US" sz="3200" dirty="0"/>
           </a:p>
         </p:txBody>
       </p:sp>
@@ -6347,6 +6353,13 @@
   <p:clrMapOvr>
     <a:masterClrMapping/>
   </p:clrMapOvr>
+  <p:timing>
+    <p:tnLst>
+      <p:par>
+        <p:cTn id="1" dur="indefinite" restart="never" nodeType="tmRoot"/>
+      </p:par>
+    </p:tnLst>
+  </p:timing>
 </p:sld>
 </file>
 

</xml_diff>